<commit_message>
Alteração do PITCH do formando objetivo.
</commit_message>
<xml_diff>
--- a/PastaDocProjeto/FIAP-QualidProjSW-Aula-4-AdministracaoConteudo- EXERCICIOS.pptx
+++ b/PastaDocProjeto/FIAP-QualidProjSW-Aula-4-AdministracaoConteudo- EXERCICIOS.pptx
@@ -127,6 +127,9 @@
         </p15:guide>
       </p15:sldGuideLst>
     </p:ext>
+    <p:ext uri="{2D200454-40CA-4A62-9FC3-DE9A4176ACB9}">
+      <p15:notesGuideLst xmlns:p15="http://schemas.microsoft.com/office/powerpoint/2012/main"/>
+    </p:ext>
   </p:extLst>
 </p:presentation>
 </file>
@@ -225,7 +228,7 @@
           <a:p>
             <a:fld id="{F8977565-27DA-4165-A15C-AFF4314E7084}" type="datetimeFigureOut">
               <a:rPr lang="pt-BR" smtClean="0"/>
-              <a:t>27/01/2023</a:t>
+              <a:t>06/03/2024</a:t>
             </a:fld>
             <a:endParaRPr lang="pt-BR"/>
           </a:p>
@@ -303,7 +306,7 @@
           <a:p>
             <a:fld id="{EF8441B9-E307-45F0-B6FF-00313ED2A7C1}" type="slidenum">
               <a:rPr lang="pt-BR" smtClean="0"/>
-              <a:t>‹nº›</a:t>
+              <a:t>‹#›</a:t>
             </a:fld>
             <a:endParaRPr lang="pt-BR"/>
           </a:p>
@@ -402,7 +405,7 @@
           <a:p>
             <a:fld id="{B6D4C934-FEA0-426E-B081-61FE807EA637}" type="datetimeFigureOut">
               <a:rPr lang="pt-BR" smtClean="0"/>
-              <a:t>27/01/2023</a:t>
+              <a:t>06/03/2024</a:t>
             </a:fld>
             <a:endParaRPr lang="pt-BR"/>
           </a:p>
@@ -560,7 +563,7 @@
           <a:p>
             <a:fld id="{F69DE88B-C5FB-4190-8CD8-D803F1201C56}" type="slidenum">
               <a:rPr lang="pt-BR" smtClean="0"/>
-              <a:t>‹nº›</a:t>
+              <a:t>‹#›</a:t>
             </a:fld>
             <a:endParaRPr lang="pt-BR"/>
           </a:p>
@@ -1244,7 +1247,7 @@
           <a:p>
             <a:fld id="{89C4B140-6DEB-45EB-A5FE-2FE213A19AB6}" type="datetimeFigureOut">
               <a:rPr lang="pt-BR" smtClean="0"/>
-              <a:t>27/01/2023</a:t>
+              <a:t>06/03/2024</a:t>
             </a:fld>
             <a:endParaRPr lang="pt-BR"/>
           </a:p>
@@ -1302,7 +1305,7 @@
           <a:p>
             <a:fld id="{1BC5D9AF-0A3A-46C6-9823-3468E6F7B9BB}" type="slidenum">
               <a:rPr lang="pt-BR" smtClean="0"/>
-              <a:t>‹nº›</a:t>
+              <a:t>‹#›</a:t>
             </a:fld>
             <a:endParaRPr lang="pt-BR"/>
           </a:p>
@@ -1452,7 +1455,7 @@
           <a:p>
             <a:fld id="{89C4B140-6DEB-45EB-A5FE-2FE213A19AB6}" type="datetimeFigureOut">
               <a:rPr lang="pt-BR" smtClean="0"/>
-              <a:t>27/01/2023</a:t>
+              <a:t>06/03/2024</a:t>
             </a:fld>
             <a:endParaRPr lang="pt-BR"/>
           </a:p>
@@ -1510,7 +1513,7 @@
           <a:p>
             <a:fld id="{1BC5D9AF-0A3A-46C6-9823-3468E6F7B9BB}" type="slidenum">
               <a:rPr lang="pt-BR" smtClean="0"/>
-              <a:t>‹nº›</a:t>
+              <a:t>‹#›</a:t>
             </a:fld>
             <a:endParaRPr lang="pt-BR"/>
           </a:p>
@@ -1660,7 +1663,7 @@
           <a:p>
             <a:fld id="{89C4B140-6DEB-45EB-A5FE-2FE213A19AB6}" type="datetimeFigureOut">
               <a:rPr lang="pt-BR" smtClean="0"/>
-              <a:t>27/01/2023</a:t>
+              <a:t>06/03/2024</a:t>
             </a:fld>
             <a:endParaRPr lang="pt-BR"/>
           </a:p>
@@ -1718,7 +1721,7 @@
           <a:p>
             <a:fld id="{1BC5D9AF-0A3A-46C6-9823-3468E6F7B9BB}" type="slidenum">
               <a:rPr lang="pt-BR" smtClean="0"/>
-              <a:t>‹nº›</a:t>
+              <a:t>‹#›</a:t>
             </a:fld>
             <a:endParaRPr lang="pt-BR"/>
           </a:p>
@@ -1916,7 +1919,7 @@
               <a:pPr>
                 <a:defRPr/>
               </a:pPr>
-              <a:t>‹nº›</a:t>
+              <a:t>‹#›</a:t>
             </a:fld>
             <a:endParaRPr lang="pt-BR"/>
           </a:p>
@@ -2066,7 +2069,7 @@
           <a:p>
             <a:fld id="{89C4B140-6DEB-45EB-A5FE-2FE213A19AB6}" type="datetimeFigureOut">
               <a:rPr lang="pt-BR" smtClean="0"/>
-              <a:t>27/01/2023</a:t>
+              <a:t>06/03/2024</a:t>
             </a:fld>
             <a:endParaRPr lang="pt-BR"/>
           </a:p>
@@ -2124,7 +2127,7 @@
           <a:p>
             <a:fld id="{1BC5D9AF-0A3A-46C6-9823-3468E6F7B9BB}" type="slidenum">
               <a:rPr lang="pt-BR" smtClean="0"/>
-              <a:t>‹nº›</a:t>
+              <a:t>‹#›</a:t>
             </a:fld>
             <a:endParaRPr lang="pt-BR"/>
           </a:p>
@@ -2341,7 +2344,7 @@
           <a:p>
             <a:fld id="{89C4B140-6DEB-45EB-A5FE-2FE213A19AB6}" type="datetimeFigureOut">
               <a:rPr lang="pt-BR" smtClean="0"/>
-              <a:t>27/01/2023</a:t>
+              <a:t>06/03/2024</a:t>
             </a:fld>
             <a:endParaRPr lang="pt-BR"/>
           </a:p>
@@ -2399,7 +2402,7 @@
           <a:p>
             <a:fld id="{1BC5D9AF-0A3A-46C6-9823-3468E6F7B9BB}" type="slidenum">
               <a:rPr lang="pt-BR" smtClean="0"/>
-              <a:t>‹nº›</a:t>
+              <a:t>‹#›</a:t>
             </a:fld>
             <a:endParaRPr lang="pt-BR"/>
           </a:p>
@@ -2664,7 +2667,7 @@
           <a:p>
             <a:fld id="{89C4B140-6DEB-45EB-A5FE-2FE213A19AB6}" type="datetimeFigureOut">
               <a:rPr lang="pt-BR" smtClean="0"/>
-              <a:t>27/01/2023</a:t>
+              <a:t>06/03/2024</a:t>
             </a:fld>
             <a:endParaRPr lang="pt-BR"/>
           </a:p>
@@ -2722,7 +2725,7 @@
           <a:p>
             <a:fld id="{1BC5D9AF-0A3A-46C6-9823-3468E6F7B9BB}" type="slidenum">
               <a:rPr lang="pt-BR" smtClean="0"/>
-              <a:t>‹nº›</a:t>
+              <a:t>‹#›</a:t>
             </a:fld>
             <a:endParaRPr lang="pt-BR"/>
           </a:p>
@@ -3127,7 +3130,7 @@
           <a:p>
             <a:fld id="{89C4B140-6DEB-45EB-A5FE-2FE213A19AB6}" type="datetimeFigureOut">
               <a:rPr lang="pt-BR" smtClean="0"/>
-              <a:t>27/01/2023</a:t>
+              <a:t>06/03/2024</a:t>
             </a:fld>
             <a:endParaRPr lang="pt-BR"/>
           </a:p>
@@ -3185,7 +3188,7 @@
           <a:p>
             <a:fld id="{1BC5D9AF-0A3A-46C6-9823-3468E6F7B9BB}" type="slidenum">
               <a:rPr lang="pt-BR" smtClean="0"/>
-              <a:t>‹nº›</a:t>
+              <a:t>‹#›</a:t>
             </a:fld>
             <a:endParaRPr lang="pt-BR"/>
           </a:p>
@@ -3276,7 +3279,7 @@
           <a:p>
             <a:fld id="{89C4B140-6DEB-45EB-A5FE-2FE213A19AB6}" type="datetimeFigureOut">
               <a:rPr lang="pt-BR" smtClean="0"/>
-              <a:t>27/01/2023</a:t>
+              <a:t>06/03/2024</a:t>
             </a:fld>
             <a:endParaRPr lang="pt-BR"/>
           </a:p>
@@ -3334,7 +3337,7 @@
           <a:p>
             <a:fld id="{1BC5D9AF-0A3A-46C6-9823-3468E6F7B9BB}" type="slidenum">
               <a:rPr lang="pt-BR" smtClean="0"/>
-              <a:t>‹nº›</a:t>
+              <a:t>‹#›</a:t>
             </a:fld>
             <a:endParaRPr lang="pt-BR"/>
           </a:p>
@@ -3395,7 +3398,7 @@
           <a:p>
             <a:fld id="{89C4B140-6DEB-45EB-A5FE-2FE213A19AB6}" type="datetimeFigureOut">
               <a:rPr lang="pt-BR" smtClean="0"/>
-              <a:t>27/01/2023</a:t>
+              <a:t>06/03/2024</a:t>
             </a:fld>
             <a:endParaRPr lang="pt-BR"/>
           </a:p>
@@ -3453,7 +3456,7 @@
           <a:p>
             <a:fld id="{1BC5D9AF-0A3A-46C6-9823-3468E6F7B9BB}" type="slidenum">
               <a:rPr lang="pt-BR" smtClean="0"/>
-              <a:t>‹nº›</a:t>
+              <a:t>‹#›</a:t>
             </a:fld>
             <a:endParaRPr lang="pt-BR"/>
           </a:p>
@@ -3703,7 +3706,7 @@
           <a:p>
             <a:fld id="{89C4B140-6DEB-45EB-A5FE-2FE213A19AB6}" type="datetimeFigureOut">
               <a:rPr lang="pt-BR" smtClean="0"/>
-              <a:t>27/01/2023</a:t>
+              <a:t>06/03/2024</a:t>
             </a:fld>
             <a:endParaRPr lang="pt-BR"/>
           </a:p>
@@ -3761,7 +3764,7 @@
           <a:p>
             <a:fld id="{1BC5D9AF-0A3A-46C6-9823-3468E6F7B9BB}" type="slidenum">
               <a:rPr lang="pt-BR" smtClean="0"/>
-              <a:t>‹nº›</a:t>
+              <a:t>‹#›</a:t>
             </a:fld>
             <a:endParaRPr lang="pt-BR"/>
           </a:p>
@@ -3988,7 +3991,7 @@
           <a:p>
             <a:fld id="{89C4B140-6DEB-45EB-A5FE-2FE213A19AB6}" type="datetimeFigureOut">
               <a:rPr lang="pt-BR" smtClean="0"/>
-              <a:t>27/01/2023</a:t>
+              <a:t>06/03/2024</a:t>
             </a:fld>
             <a:endParaRPr lang="pt-BR"/>
           </a:p>
@@ -4046,7 +4049,7 @@
           <a:p>
             <a:fld id="{1BC5D9AF-0A3A-46C6-9823-3468E6F7B9BB}" type="slidenum">
               <a:rPr lang="pt-BR" smtClean="0"/>
-              <a:t>‹nº›</a:t>
+              <a:t>‹#›</a:t>
             </a:fld>
             <a:endParaRPr lang="pt-BR"/>
           </a:p>
@@ -4864,7 +4867,7 @@
         <p:spPr>
           <a:xfrm>
             <a:off x="735997" y="1052736"/>
-            <a:ext cx="5054717" cy="369332"/>
+            <a:ext cx="5970032" cy="369332"/>
           </a:xfrm>
           <a:prstGeom prst="rect">
             <a:avLst/>
@@ -4883,19 +4886,12 @@
               <a:rPr lang="pt-BR" sz="1800" dirty="0">
                 <a:latin typeface="Calibri" panose="020F0502020204030204" pitchFamily="34" charset="0"/>
               </a:rPr>
-              <a:t>DISCIPLINA</a:t>
-            </a:r>
-            <a:r>
-              <a:rPr lang="pt-BR" sz="1800">
-                <a:latin typeface="Calibri" panose="020F0502020204030204" pitchFamily="34" charset="0"/>
-              </a:rPr>
-              <a:t>:   </a:t>
-            </a:r>
-            <a:r>
-              <a:rPr lang="pt-BR" b="1"/>
-              <a:t>COMPLIANCE &amp; QUALITY ASSURANCE</a:t>
-            </a:r>
-            <a:endParaRPr lang="pt-BR" b="1" dirty="0"/>
+              <a:t>DISCIPLINA:   </a:t>
+            </a:r>
+            <a:r>
+              <a:rPr lang="pt-BR" b="1" dirty="0"/>
+              <a:t>COMPLIANCE &amp; QUALITY ASSURANCE - Vinicius</a:t>
+            </a:r>
           </a:p>
         </p:txBody>
       </p:sp>

</xml_diff>